<commit_message>
removed dates off all slide decks
</commit_message>
<xml_diff>
--- a/presentations/Session_3_Services_Overview.pptx
+++ b/presentations/Session_3_Services_Overview.pptx
@@ -1627,11 +1627,7 @@
             </a:pPr>
             <a:r>
               <a:rPr lang="en-US" dirty="0"/>
-              <a:t>Deployed with a multi-node cluster; </a:t>
-            </a:r>
-            <a:r>
-              <a:rPr lang="en-US" dirty="0"/>
-              <a:t>Balanced across Availability zones</a:t>
+              <a:t>Deployed with a multi-node cluster; Balanced across Availability zones</a:t>
             </a:r>
             <a:endParaRPr lang="en-US" dirty="0">
               <a:solidFill>
@@ -6752,7 +6748,6 @@
               <a:rPr lang="en-US" sz="2800" dirty="0" smtClean="0"/>
               <a:t>Services</a:t>
             </a:r>
-            <a:endParaRPr lang="en-US" sz="2800" dirty="0" smtClean="0"/>
           </a:p>
         </p:txBody>
       </p:sp>
@@ -6831,11 +6826,6 @@
               </a:rPr>
               <a:t>Vision: Make all data products cloud-ready.</a:t>
             </a:r>
-            <a:endParaRPr lang="en-US" sz="2800" dirty="0">
-              <a:solidFill>
-                <a:srgbClr val="2C95DD"/>
-              </a:solidFill>
-            </a:endParaRPr>
           </a:p>
         </p:txBody>
       </p:sp>
@@ -7079,11 +7069,6 @@
               </a:rPr>
               <a:t>/Geode</a:t>
             </a:r>
-            <a:endParaRPr lang="en-US" dirty="0" smtClean="0">
-              <a:solidFill>
-                <a:schemeClr val="bg2"/>
-              </a:solidFill>
-            </a:endParaRPr>
           </a:p>
           <a:p>
             <a:pPr marL="285750" indent="-285750">
@@ -7112,21 +7097,8 @@
                   <a:schemeClr val="bg2"/>
                 </a:solidFill>
               </a:rPr>
-              <a:t> (includes HAWQ), Spring </a:t>
-            </a:r>
-            <a:r>
-              <a:rPr lang="en-US" dirty="0" smtClean="0">
-                <a:solidFill>
-                  <a:schemeClr val="bg2"/>
-                </a:solidFill>
-              </a:rPr>
-              <a:t>XD</a:t>
-            </a:r>
-            <a:endParaRPr lang="en-US" dirty="0" smtClean="0">
-              <a:solidFill>
-                <a:schemeClr val="bg2"/>
-              </a:solidFill>
-            </a:endParaRPr>
+              <a:t> (includes HAWQ), Spring XD</a:t>
+            </a:r>
           </a:p>
         </p:txBody>
       </p:sp>
@@ -7590,21 +7562,8 @@
                   <a:srgbClr val="2C95DD"/>
                 </a:solidFill>
               </a:rPr>
-              <a:t>for Pivotal </a:t>
-            </a:r>
-            <a:r>
-              <a:rPr lang="en-US" sz="2800" dirty="0">
-                <a:solidFill>
-                  <a:srgbClr val="2C95DD"/>
-                </a:solidFill>
-              </a:rPr>
-              <a:t>Cloud Foundry</a:t>
-            </a:r>
-            <a:endParaRPr lang="en-US" sz="2800" dirty="0">
-              <a:solidFill>
-                <a:srgbClr val="2C95DD"/>
-              </a:solidFill>
-            </a:endParaRPr>
+              <a:t>for Pivotal Cloud Foundry</a:t>
+            </a:r>
           </a:p>
         </p:txBody>
       </p:sp>
@@ -7969,29 +7928,8 @@
                   <a:srgbClr val="2C95DD"/>
                 </a:solidFill>
               </a:rPr>
-              <a:t>for </a:t>
-            </a:r>
-            <a:r>
-              <a:rPr lang="en-US" sz="2800" dirty="0">
-                <a:solidFill>
-                  <a:srgbClr val="2C95DD"/>
-                </a:solidFill>
-              </a:rPr>
-              <a:t>Pivotal </a:t>
-            </a:r>
-            <a:r>
-              <a:rPr lang="en-US" sz="2800" dirty="0">
-                <a:solidFill>
-                  <a:srgbClr val="2C95DD"/>
-                </a:solidFill>
-              </a:rPr>
-              <a:t>Cloud Foundry </a:t>
-            </a:r>
-            <a:endParaRPr lang="en-US" sz="2800" dirty="0">
-              <a:solidFill>
-                <a:srgbClr val="2C95DD"/>
-              </a:solidFill>
-            </a:endParaRPr>
+              <a:t>for Pivotal Cloud Foundry </a:t>
+            </a:r>
           </a:p>
         </p:txBody>
       </p:sp>
@@ -8036,23 +7974,7 @@
                   <a:srgbClr val="FFFFFF"/>
                 </a:solidFill>
               </a:rPr>
-              <a:t>-provision a </a:t>
-            </a:r>
-            <a:r>
-              <a:rPr lang="en-US" sz="2000" dirty="0">
-                <a:solidFill>
-                  <a:srgbClr val="FFFFFF"/>
-                </a:solidFill>
-              </a:rPr>
-              <a:t>pool</a:t>
-            </a:r>
-            <a:r>
-              <a:rPr lang="en-US" sz="2000" dirty="0">
-                <a:solidFill>
-                  <a:srgbClr val="FFFFFF"/>
-                </a:solidFill>
-              </a:rPr>
-              <a:t> of </a:t>
+              <a:t>-provision a pool of </a:t>
             </a:r>
             <a:r>
               <a:rPr lang="en-US" sz="2000" dirty="0" err="1">
@@ -9192,29 +9114,8 @@
                   <a:srgbClr val="2C95DD"/>
                 </a:solidFill>
               </a:rPr>
-              <a:t>for </a:t>
-            </a:r>
-            <a:r>
-              <a:rPr lang="en-US" sz="2800" dirty="0">
-                <a:solidFill>
-                  <a:srgbClr val="2C95DD"/>
-                </a:solidFill>
-              </a:rPr>
-              <a:t>Pivotal </a:t>
-            </a:r>
-            <a:r>
-              <a:rPr lang="en-US" sz="2800" dirty="0">
-                <a:solidFill>
-                  <a:srgbClr val="2C95DD"/>
-                </a:solidFill>
-              </a:rPr>
-              <a:t>Cloud Foundry</a:t>
-            </a:r>
-            <a:endParaRPr lang="en-US" sz="2800" dirty="0">
-              <a:solidFill>
-                <a:srgbClr val="2C95DD"/>
-              </a:solidFill>
-            </a:endParaRPr>
+              <a:t>for Pivotal Cloud Foundry</a:t>
+            </a:r>
           </a:p>
         </p:txBody>
       </p:sp>
@@ -9868,11 +9769,11 @@
   <p:clrMapOvr>
     <a:masterClrMapping/>
   </p:clrMapOvr>
-  <mc:AlternateContent xmlns:mc="http://schemas.openxmlformats.org/markup-compatibility/2006">
-    <mc:Choice xmlns:p14="http://schemas.microsoft.com/office/powerpoint/2010/main" Requires="p14">
+  <mc:AlternateContent xmlns:mc="http://schemas.openxmlformats.org/markup-compatibility/2006" xmlns:p14="http://schemas.microsoft.com/office/powerpoint/2010/main">
+    <mc:Choice Requires="p14">
       <p:transition spd="slow" p14:dur="2000"/>
     </mc:Choice>
-    <mc:Fallback>
+    <mc:Fallback xmlns="">
       <p:transition xmlns:p14="http://schemas.microsoft.com/office/powerpoint/2010/main" spd="slow"/>
     </mc:Fallback>
   </mc:AlternateContent>
@@ -9978,11 +9879,11 @@
   <p:clrMapOvr>
     <a:masterClrMapping/>
   </p:clrMapOvr>
-  <mc:AlternateContent xmlns:mc="http://schemas.openxmlformats.org/markup-compatibility/2006">
-    <mc:Choice xmlns:p14="http://schemas.microsoft.com/office/powerpoint/2010/main" Requires="p14">
+  <mc:AlternateContent xmlns:mc="http://schemas.openxmlformats.org/markup-compatibility/2006" xmlns:p14="http://schemas.microsoft.com/office/powerpoint/2010/main">
+    <mc:Choice Requires="p14">
       <p:transition spd="slow" p14:dur="2000"/>
     </mc:Choice>
-    <mc:Fallback>
+    <mc:Fallback xmlns="">
       <p:transition xmlns:p14="http://schemas.microsoft.com/office/powerpoint/2010/main" spd="slow"/>
     </mc:Fallback>
   </mc:AlternateContent>
@@ -10488,11 +10389,6 @@
               </a:rPr>
               <a:t>CF Mobile Services</a:t>
             </a:r>
-            <a:endParaRPr lang="en-US" sz="2800" dirty="0">
-              <a:solidFill>
-                <a:srgbClr val="2C95DD"/>
-              </a:solidFill>
-            </a:endParaRPr>
           </a:p>
         </p:txBody>
       </p:sp>
@@ -11329,11 +11225,11 @@
   <p:clrMapOvr>
     <a:masterClrMapping/>
   </p:clrMapOvr>
-  <mc:AlternateContent xmlns:mc="http://schemas.openxmlformats.org/markup-compatibility/2006">
-    <mc:Choice xmlns:p14="http://schemas.microsoft.com/office/powerpoint/2010/main" Requires="p14">
+  <mc:AlternateContent xmlns:mc="http://schemas.openxmlformats.org/markup-compatibility/2006" xmlns:p14="http://schemas.microsoft.com/office/powerpoint/2010/main">
+    <mc:Choice Requires="p14">
       <p:transition spd="slow" p14:dur="2000"/>
     </mc:Choice>
-    <mc:Fallback>
+    <mc:Fallback xmlns="">
       <p:transition xmlns:p14="http://schemas.microsoft.com/office/powerpoint/2010/main" spd="slow"/>
     </mc:Fallback>
   </mc:AlternateContent>
@@ -11399,11 +11295,6 @@
               </a:rPr>
               <a:t>Notifications</a:t>
             </a:r>
-            <a:endParaRPr lang="en-US" sz="2800" dirty="0">
-              <a:solidFill>
-                <a:srgbClr val="2C95DD"/>
-              </a:solidFill>
-            </a:endParaRPr>
           </a:p>
         </p:txBody>
       </p:sp>
@@ -11524,15 +11415,7 @@
                   <a:srgbClr val="FFFFFF"/>
                 </a:solidFill>
               </a:rPr>
-              <a:t> push providers with services behind the </a:t>
-            </a:r>
-            <a:r>
-              <a:rPr lang="en-US" sz="1800" dirty="0" smtClean="0">
-                <a:solidFill>
-                  <a:srgbClr val="FFFFFF"/>
-                </a:solidFill>
-              </a:rPr>
-              <a:t>firewall</a:t>
+              <a:t> push providers with services behind the firewall</a:t>
             </a:r>
           </a:p>
           <a:p>
@@ -11655,11 +11538,11 @@
   <p:clrMapOvr>
     <a:masterClrMapping/>
   </p:clrMapOvr>
-  <mc:AlternateContent xmlns:mc="http://schemas.openxmlformats.org/markup-compatibility/2006">
-    <mc:Choice xmlns:p14="http://schemas.microsoft.com/office/powerpoint/2010/main" Requires="p14">
+  <mc:AlternateContent xmlns:mc="http://schemas.openxmlformats.org/markup-compatibility/2006" xmlns:p14="http://schemas.microsoft.com/office/powerpoint/2010/main">
+    <mc:Choice Requires="p14">
       <p:transition spd="slow" p14:dur="2000"/>
     </mc:Choice>
-    <mc:Fallback>
+    <mc:Fallback xmlns="">
       <p:transition xmlns:p14="http://schemas.microsoft.com/office/powerpoint/2010/main" spd="slow"/>
     </mc:Fallback>
   </mc:AlternateContent>
@@ -11725,11 +11608,6 @@
               </a:rPr>
               <a:t>Sync</a:t>
             </a:r>
-            <a:endParaRPr lang="en-US" sz="2800" dirty="0">
-              <a:solidFill>
-                <a:srgbClr val="2C95DD"/>
-              </a:solidFill>
-            </a:endParaRPr>
           </a:p>
         </p:txBody>
       </p:sp>
@@ -11820,15 +11698,7 @@
                   <a:srgbClr val="FFFFFF"/>
                 </a:solidFill>
               </a:rPr>
-              <a:t>Existing services provide public cloud “black box” </a:t>
-            </a:r>
-            <a:r>
-              <a:rPr lang="en-US" sz="1800" dirty="0" smtClean="0">
-                <a:solidFill>
-                  <a:srgbClr val="FFFFFF"/>
-                </a:solidFill>
-              </a:rPr>
-              <a:t>storage</a:t>
+              <a:t>Existing services provide public cloud “black box” storage</a:t>
             </a:r>
           </a:p>
           <a:p>
@@ -11926,11 +11796,11 @@
   <p:clrMapOvr>
     <a:masterClrMapping/>
   </p:clrMapOvr>
-  <mc:AlternateContent xmlns:mc="http://schemas.openxmlformats.org/markup-compatibility/2006">
-    <mc:Choice xmlns:p14="http://schemas.microsoft.com/office/powerpoint/2010/main" Requires="p14">
+  <mc:AlternateContent xmlns:mc="http://schemas.openxmlformats.org/markup-compatibility/2006" xmlns:p14="http://schemas.microsoft.com/office/powerpoint/2010/main">
+    <mc:Choice Requires="p14">
       <p:transition spd="slow" p14:dur="2000"/>
     </mc:Choice>
-    <mc:Fallback>
+    <mc:Fallback xmlns="">
       <p:transition xmlns:p14="http://schemas.microsoft.com/office/powerpoint/2010/main" spd="slow"/>
     </mc:Fallback>
   </mc:AlternateContent>
@@ -14881,15 +14751,7 @@
                   <a:srgbClr val="2C95DD"/>
                 </a:solidFill>
               </a:rPr>
-              <a:t>Cloud Native Application </a:t>
-            </a:r>
-            <a:r>
-              <a:rPr lang="en-US" sz="2800" dirty="0" smtClean="0">
-                <a:solidFill>
-                  <a:srgbClr val="2C95DD"/>
-                </a:solidFill>
-              </a:rPr>
-              <a:t>Platform - Services</a:t>
+              <a:t>Cloud Native Application Platform - Services</a:t>
             </a:r>
             <a:endParaRPr lang="en-US" sz="2800" dirty="0">
               <a:solidFill>
@@ -14965,29 +14827,8 @@
                   <a:srgbClr val="2C95DD"/>
                 </a:solidFill>
               </a:rPr>
-              <a:t>API </a:t>
-            </a:r>
-            <a:r>
-              <a:rPr lang="en-US" sz="2800" dirty="0">
-                <a:solidFill>
-                  <a:srgbClr val="2C95DD"/>
-                </a:solidFill>
-              </a:rPr>
-              <a:t>G</a:t>
-            </a:r>
-            <a:r>
-              <a:rPr lang="en-US" sz="2800" dirty="0">
-                <a:solidFill>
-                  <a:srgbClr val="2C95DD"/>
-                </a:solidFill>
-              </a:rPr>
-              <a:t>ateway</a:t>
-            </a:r>
-            <a:endParaRPr lang="en-US" sz="2800" dirty="0">
-              <a:solidFill>
-                <a:srgbClr val="2C95DD"/>
-              </a:solidFill>
-            </a:endParaRPr>
+              <a:t>API Gateway</a:t>
+            </a:r>
           </a:p>
         </p:txBody>
       </p:sp>
@@ -15076,15 +14917,7 @@
                   <a:srgbClr val="FFFFFF"/>
                 </a:solidFill>
               </a:rPr>
-              <a:t>Mobile apps often require several API calls to display a single page of </a:t>
-            </a:r>
-            <a:r>
-              <a:rPr lang="en-US" sz="1800" dirty="0" smtClean="0">
-                <a:solidFill>
-                  <a:srgbClr val="FFFFFF"/>
-                </a:solidFill>
-              </a:rPr>
-              <a:t>content</a:t>
+              <a:t>Mobile apps often require several API calls to display a single page of content</a:t>
             </a:r>
           </a:p>
           <a:p>
@@ -15172,11 +15005,11 @@
   <p:clrMapOvr>
     <a:masterClrMapping/>
   </p:clrMapOvr>
-  <mc:AlternateContent xmlns:mc="http://schemas.openxmlformats.org/markup-compatibility/2006">
-    <mc:Choice xmlns:p14="http://schemas.microsoft.com/office/powerpoint/2010/main" Requires="p14">
+  <mc:AlternateContent xmlns:mc="http://schemas.openxmlformats.org/markup-compatibility/2006" xmlns:p14="http://schemas.microsoft.com/office/powerpoint/2010/main">
+    <mc:Choice Requires="p14">
       <p:transition spd="slow" p14:dur="2000"/>
     </mc:Choice>
-    <mc:Fallback>
+    <mc:Fallback xmlns="">
       <p:transition xmlns:p14="http://schemas.microsoft.com/office/powerpoint/2010/main" spd="slow"/>
     </mc:Fallback>
   </mc:AlternateContent>
@@ -15230,11 +15063,6 @@
               </a:rPr>
               <a:t>App Distribution</a:t>
             </a:r>
-            <a:endParaRPr lang="en-US" sz="2800" dirty="0">
-              <a:solidFill>
-                <a:srgbClr val="2C95DD"/>
-              </a:solidFill>
-            </a:endParaRPr>
           </a:p>
         </p:txBody>
       </p:sp>
@@ -15309,15 +15137,7 @@
                   <a:srgbClr val="FFFFFF"/>
                 </a:solidFill>
               </a:rPr>
-              <a:t>Existing solutions are public </a:t>
-            </a:r>
-            <a:r>
-              <a:rPr lang="en-US" sz="1800" dirty="0" smtClean="0">
-                <a:solidFill>
-                  <a:srgbClr val="FFFFFF"/>
-                </a:solidFill>
-              </a:rPr>
-              <a:t>cloud</a:t>
+              <a:t>Existing solutions are public cloud</a:t>
             </a:r>
           </a:p>
           <a:p>
@@ -15443,11 +15263,11 @@
   <p:clrMapOvr>
     <a:masterClrMapping/>
   </p:clrMapOvr>
-  <mc:AlternateContent xmlns:mc="http://schemas.openxmlformats.org/markup-compatibility/2006">
-    <mc:Choice xmlns:p14="http://schemas.microsoft.com/office/powerpoint/2010/main" Requires="p14">
+  <mc:AlternateContent xmlns:mc="http://schemas.openxmlformats.org/markup-compatibility/2006" xmlns:p14="http://schemas.microsoft.com/office/powerpoint/2010/main">
+    <mc:Choice Requires="p14">
       <p:transition spd="slow" p14:dur="2000"/>
     </mc:Choice>
-    <mc:Fallback>
+    <mc:Fallback xmlns="">
       <p:transition xmlns:p14="http://schemas.microsoft.com/office/powerpoint/2010/main" spd="slow"/>
     </mc:Fallback>
   </mc:AlternateContent>
@@ -15517,23 +15337,7 @@
                   <a:srgbClr val="FFFFFF"/>
                 </a:solidFill>
               </a:rPr>
-              <a:t>Allows </a:t>
-            </a:r>
-            <a:r>
-              <a:rPr lang="en-US" sz="1800" dirty="0">
-                <a:solidFill>
-                  <a:srgbClr val="FFFFFF"/>
-                </a:solidFill>
-              </a:rPr>
-              <a:t>resources to be easily provisioned on-</a:t>
-            </a:r>
-            <a:r>
-              <a:rPr lang="en-US" sz="1800" dirty="0">
-                <a:solidFill>
-                  <a:srgbClr val="FFFFFF"/>
-                </a:solidFill>
-              </a:rPr>
-              <a:t>demand</a:t>
+              <a:t>Allows resources to be easily provisioned on-demand</a:t>
             </a:r>
           </a:p>
           <a:p>
@@ -15553,23 +15357,7 @@
                   <a:srgbClr val="FFFFFF"/>
                 </a:solidFill>
               </a:rPr>
-              <a:t>Typically </a:t>
-            </a:r>
-            <a:r>
-              <a:rPr lang="en-US" sz="1800" dirty="0">
-                <a:solidFill>
-                  <a:srgbClr val="FFFFFF"/>
-                </a:solidFill>
-              </a:rPr>
-              <a:t>middleware, frameworks, and other “components” </a:t>
-            </a:r>
-            <a:r>
-              <a:rPr lang="en-US" sz="1800" dirty="0">
-                <a:solidFill>
-                  <a:srgbClr val="FFFFFF"/>
-                </a:solidFill>
-              </a:rPr>
-              <a:t>necessary for applications</a:t>
+              <a:t>Typically middleware, frameworks, and other “components” necessary for applications</a:t>
             </a:r>
           </a:p>
           <a:p>
@@ -15607,11 +15395,6 @@
               </a:rPr>
               <a:t> layer</a:t>
             </a:r>
-            <a:endParaRPr lang="en-US" sz="1800" dirty="0">
-              <a:solidFill>
-                <a:srgbClr val="FFFFFF"/>
-              </a:solidFill>
-            </a:endParaRPr>
           </a:p>
         </p:txBody>
       </p:sp>
@@ -15723,11 +15506,11 @@
   <p:clrMapOvr>
     <a:masterClrMapping/>
   </p:clrMapOvr>
-  <mc:AlternateContent xmlns:mc="http://schemas.openxmlformats.org/markup-compatibility/2006">
-    <mc:Choice xmlns:p14="http://schemas.microsoft.com/office/powerpoint/2010/main" Requires="p14">
+  <mc:AlternateContent xmlns:mc="http://schemas.openxmlformats.org/markup-compatibility/2006" xmlns:p14="http://schemas.microsoft.com/office/powerpoint/2010/main">
+    <mc:Choice Requires="p14">
       <p:transition spd="slow" p14:dur="2000"/>
     </mc:Choice>
-    <mc:Fallback>
+    <mc:Fallback xmlns="">
       <p:transition xmlns:p14="http://schemas.microsoft.com/office/powerpoint/2010/main" spd="slow"/>
     </mc:Fallback>
   </mc:AlternateContent>
@@ -15822,11 +15605,6 @@
               </a:rPr>
               <a:t>Types of Services</a:t>
             </a:r>
-            <a:endParaRPr lang="en-US" sz="2800" dirty="0">
-              <a:solidFill>
-                <a:srgbClr val="2C95DD"/>
-              </a:solidFill>
-            </a:endParaRPr>
           </a:p>
         </p:txBody>
       </p:sp>
@@ -17851,11 +17629,6 @@
               </a:rPr>
               <a:t>Broker</a:t>
             </a:r>
-            <a:endParaRPr lang="en-US" sz="2800" dirty="0">
-              <a:solidFill>
-                <a:srgbClr val="2C95DD"/>
-              </a:solidFill>
-            </a:endParaRPr>
           </a:p>
         </p:txBody>
       </p:sp>
@@ -20028,11 +19801,11 @@
   <p:clrMapOvr>
     <a:masterClrMapping/>
   </p:clrMapOvr>
-  <mc:AlternateContent xmlns:mc="http://schemas.openxmlformats.org/markup-compatibility/2006">
-    <mc:Choice xmlns:p14="http://schemas.microsoft.com/office/powerpoint/2010/main" Requires="p14">
+  <mc:AlternateContent xmlns:mc="http://schemas.openxmlformats.org/markup-compatibility/2006" xmlns:p14="http://schemas.microsoft.com/office/powerpoint/2010/main">
+    <mc:Choice Requires="p14">
       <p:transition spd="slow" p14:dur="2000"/>
     </mc:Choice>
-    <mc:Fallback>
+    <mc:Fallback xmlns="">
       <p:transition xmlns:p14="http://schemas.microsoft.com/office/powerpoint/2010/main" spd="slow"/>
     </mc:Fallback>
   </mc:AlternateContent>
@@ -23456,11 +23229,6 @@
               </a:rPr>
               <a:t>Cloud Foundry Services</a:t>
             </a:r>
-            <a:endParaRPr lang="en-US" sz="2800" dirty="0">
-              <a:solidFill>
-                <a:srgbClr val="2C95DD"/>
-              </a:solidFill>
-            </a:endParaRPr>
           </a:p>
         </p:txBody>
       </p:sp>
@@ -23882,11 +23650,6 @@
               </a:rPr>
               <a:t>Marketplace</a:t>
             </a:r>
-            <a:endParaRPr lang="en-US" sz="2800" dirty="0">
-              <a:solidFill>
-                <a:srgbClr val="2C95DD"/>
-              </a:solidFill>
-            </a:endParaRPr>
           </a:p>
         </p:txBody>
       </p:sp>
@@ -24198,21 +23961,8 @@
                   <a:srgbClr val="FFFFFF"/>
                 </a:solidFill>
               </a:rPr>
-              <a:t>Broad Services </a:t>
-            </a:r>
-            <a:r>
-              <a:rPr lang="en-US" sz="2400" dirty="0" smtClean="0">
-                <a:solidFill>
-                  <a:srgbClr val="FFFFFF"/>
-                </a:solidFill>
-              </a:rPr>
-              <a:t>Ecosystem</a:t>
-            </a:r>
-            <a:endParaRPr lang="en-US" sz="2400" dirty="0" smtClean="0">
-              <a:solidFill>
-                <a:srgbClr val="FFFFFF"/>
-              </a:solidFill>
-            </a:endParaRPr>
+              <a:t>Broad Services Ecosystem</a:t>
+            </a:r>
           </a:p>
           <a:p>
             <a:pPr marL="342900" indent="-342900">
@@ -24232,15 +23982,7 @@
                   <a:srgbClr val="FFFFFF"/>
                 </a:solidFill>
               </a:rPr>
-              <a:t>Easy </a:t>
-            </a:r>
-            <a:r>
-              <a:rPr lang="en-US" sz="2400" dirty="0" smtClean="0">
-                <a:solidFill>
-                  <a:srgbClr val="FFFFFF"/>
-                </a:solidFill>
-              </a:rPr>
-              <a:t>accessibility</a:t>
+              <a:t>Easy accessibility</a:t>
             </a:r>
             <a:endParaRPr lang="en-US" sz="2400" dirty="0">
               <a:solidFill>

</xml_diff>